<commit_message>
Update PSP(Projektbezogene Recherche und Einarbeitung)
</commit_message>
<xml_diff>
--- a/Meilenstein1/2.Projekstrukturplan/Projektstrukturplan.pptx
+++ b/Meilenstein1/2.Projekstrukturplan/Projektstrukturplan.pptx
@@ -1742,14 +1742,14 @@
             <a:buAutoNum type="arabicPeriod"/>
           </a:pPr>
           <a:r>
-            <a:rPr lang="de-DE"/>
+            <a:rPr lang="de-DE" dirty="0"/>
             <a:t>TA 2.2</a:t>
           </a:r>
           <a:br>
-            <a:rPr lang="de-DE"/>
+            <a:rPr lang="de-DE" dirty="0"/>
           </a:br>
           <a:r>
-            <a:rPr lang="de-DE"/>
+            <a:rPr lang="de-DE" dirty="0"/>
             <a:t>Projektdetailplanung</a:t>
           </a:r>
         </a:p>
@@ -2045,16 +2045,17 @@
             <a:buAutoNum type="arabicPeriod"/>
           </a:pPr>
           <a:r>
-            <a:rPr lang="de-DE"/>
+            <a:rPr lang="de-DE" dirty="0"/>
             <a:t>TA 3.1</a:t>
           </a:r>
           <a:br>
             <a:rPr lang="de-DE"/>
           </a:br>
           <a:r>
-            <a:rPr lang="de-DE"/>
-            <a:t>Projektbezogene Einarbeitung</a:t>
+            <a:rPr lang="de-DE" b="0" i="0"/>
+            <a:t>Projektbezogene Recherche und Einarbeitung</a:t>
           </a:r>
+          <a:endParaRPr lang="de-DE" dirty="0"/>
         </a:p>
       </dgm:t>
     </dgm:pt>
@@ -10970,14 +10971,14 @@
             <a:buNone/>
           </a:pPr>
           <a:r>
-            <a:rPr lang="de-DE" sz="500" kern="1200"/>
+            <a:rPr lang="de-DE" sz="500" kern="1200" dirty="0"/>
             <a:t>TA 2.2</a:t>
           </a:r>
           <a:br>
-            <a:rPr lang="de-DE" sz="500" kern="1200"/>
+            <a:rPr lang="de-DE" sz="500" kern="1200" dirty="0"/>
           </a:br>
           <a:r>
-            <a:rPr lang="de-DE" sz="500" kern="1200"/>
+            <a:rPr lang="de-DE" sz="500" kern="1200" dirty="0"/>
             <a:t>Projektdetailplanung</a:t>
           </a:r>
         </a:p>
@@ -11557,16 +11558,17 @@
             <a:buNone/>
           </a:pPr>
           <a:r>
-            <a:rPr lang="de-DE" sz="500" kern="1200"/>
+            <a:rPr lang="de-DE" sz="500" kern="1200" dirty="0"/>
             <a:t>TA 3.1</a:t>
           </a:r>
           <a:br>
             <a:rPr lang="de-DE" sz="500" kern="1200"/>
           </a:br>
           <a:r>
-            <a:rPr lang="de-DE" sz="500" kern="1200"/>
-            <a:t>Projektbezogene Einarbeitung</a:t>
+            <a:rPr lang="de-DE" sz="500" b="0" i="0" kern="1200"/>
+            <a:t>Projektbezogene Recherche und Einarbeitung</a:t>
           </a:r>
+          <a:endParaRPr lang="de-DE" sz="500" kern="1200" dirty="0"/>
         </a:p>
       </dsp:txBody>
       <dsp:txXfrm>
@@ -16855,7 +16857,7 @@
           <a:p>
             <a:fld id="{759D99F7-FFCF-41EC-9AAE-34D3D10B2D9B}" type="datetimeFigureOut">
               <a:rPr lang="de-DE" smtClean="0"/>
-              <a:t>11.02.2025</a:t>
+              <a:t>16.02.2025</a:t>
             </a:fld>
             <a:endParaRPr lang="de-DE"/>
           </a:p>
@@ -17053,7 +17055,7 @@
           <a:p>
             <a:fld id="{759D99F7-FFCF-41EC-9AAE-34D3D10B2D9B}" type="datetimeFigureOut">
               <a:rPr lang="de-DE" smtClean="0"/>
-              <a:t>11.02.2025</a:t>
+              <a:t>16.02.2025</a:t>
             </a:fld>
             <a:endParaRPr lang="de-DE"/>
           </a:p>
@@ -17261,7 +17263,7 @@
           <a:p>
             <a:fld id="{759D99F7-FFCF-41EC-9AAE-34D3D10B2D9B}" type="datetimeFigureOut">
               <a:rPr lang="de-DE" smtClean="0"/>
-              <a:t>11.02.2025</a:t>
+              <a:t>16.02.2025</a:t>
             </a:fld>
             <a:endParaRPr lang="de-DE"/>
           </a:p>
@@ -17459,7 +17461,7 @@
           <a:p>
             <a:fld id="{759D99F7-FFCF-41EC-9AAE-34D3D10B2D9B}" type="datetimeFigureOut">
               <a:rPr lang="de-DE" smtClean="0"/>
-              <a:t>11.02.2025</a:t>
+              <a:t>16.02.2025</a:t>
             </a:fld>
             <a:endParaRPr lang="de-DE"/>
           </a:p>
@@ -17734,7 +17736,7 @@
           <a:p>
             <a:fld id="{759D99F7-FFCF-41EC-9AAE-34D3D10B2D9B}" type="datetimeFigureOut">
               <a:rPr lang="de-DE" smtClean="0"/>
-              <a:t>11.02.2025</a:t>
+              <a:t>16.02.2025</a:t>
             </a:fld>
             <a:endParaRPr lang="de-DE"/>
           </a:p>
@@ -17999,7 +18001,7 @@
           <a:p>
             <a:fld id="{759D99F7-FFCF-41EC-9AAE-34D3D10B2D9B}" type="datetimeFigureOut">
               <a:rPr lang="de-DE" smtClean="0"/>
-              <a:t>11.02.2025</a:t>
+              <a:t>16.02.2025</a:t>
             </a:fld>
             <a:endParaRPr lang="de-DE"/>
           </a:p>
@@ -18411,7 +18413,7 @@
           <a:p>
             <a:fld id="{759D99F7-FFCF-41EC-9AAE-34D3D10B2D9B}" type="datetimeFigureOut">
               <a:rPr lang="de-DE" smtClean="0"/>
-              <a:t>11.02.2025</a:t>
+              <a:t>16.02.2025</a:t>
             </a:fld>
             <a:endParaRPr lang="de-DE"/>
           </a:p>
@@ -18552,7 +18554,7 @@
           <a:p>
             <a:fld id="{759D99F7-FFCF-41EC-9AAE-34D3D10B2D9B}" type="datetimeFigureOut">
               <a:rPr lang="de-DE" smtClean="0"/>
-              <a:t>11.02.2025</a:t>
+              <a:t>16.02.2025</a:t>
             </a:fld>
             <a:endParaRPr lang="de-DE"/>
           </a:p>
@@ -18665,7 +18667,7 @@
           <a:p>
             <a:fld id="{759D99F7-FFCF-41EC-9AAE-34D3D10B2D9B}" type="datetimeFigureOut">
               <a:rPr lang="de-DE" smtClean="0"/>
-              <a:t>11.02.2025</a:t>
+              <a:t>16.02.2025</a:t>
             </a:fld>
             <a:endParaRPr lang="de-DE"/>
           </a:p>
@@ -18976,7 +18978,7 @@
           <a:p>
             <a:fld id="{759D99F7-FFCF-41EC-9AAE-34D3D10B2D9B}" type="datetimeFigureOut">
               <a:rPr lang="de-DE" smtClean="0"/>
-              <a:t>11.02.2025</a:t>
+              <a:t>16.02.2025</a:t>
             </a:fld>
             <a:endParaRPr lang="de-DE"/>
           </a:p>
@@ -19264,7 +19266,7 @@
           <a:p>
             <a:fld id="{759D99F7-FFCF-41EC-9AAE-34D3D10B2D9B}" type="datetimeFigureOut">
               <a:rPr lang="de-DE" smtClean="0"/>
-              <a:t>11.02.2025</a:t>
+              <a:t>16.02.2025</a:t>
             </a:fld>
             <a:endParaRPr lang="de-DE"/>
           </a:p>
@@ -19505,7 +19507,7 @@
           <a:p>
             <a:fld id="{759D99F7-FFCF-41EC-9AAE-34D3D10B2D9B}" type="datetimeFigureOut">
               <a:rPr lang="de-DE" smtClean="0"/>
-              <a:t>11.02.2025</a:t>
+              <a:t>16.02.2025</a:t>
             </a:fld>
             <a:endParaRPr lang="de-DE"/>
           </a:p>
@@ -19935,7 +19937,7 @@
           <p:nvPr>
             <p:extLst>
               <p:ext uri="{D42A27DB-BD31-4B8C-83A1-F6EECF244321}">
-                <p14:modId xmlns:p14="http://schemas.microsoft.com/office/powerpoint/2010/main" val="1250376009"/>
+                <p14:modId xmlns:p14="http://schemas.microsoft.com/office/powerpoint/2010/main" val="2504561996"/>
               </p:ext>
             </p:extLst>
           </p:nvPr>

</xml_diff>